<commit_message>
adding files to repository
</commit_message>
<xml_diff>
--- a/Figure_1.pptx
+++ b/Figure_1.pptx
@@ -288,7 +288,7 @@
           <a:p>
             <a:fld id="{0DE75569-4A32-0946-97B3-09718BD7F258}" type="datetimeFigureOut">
               <a:rPr lang="en-US" smtClean="0"/>
-              <a:t>8/30/18</a:t>
+              <a:t>9/4/18</a:t>
             </a:fld>
             <a:endParaRPr lang="en-US"/>
           </a:p>
@@ -458,7 +458,7 @@
           <a:p>
             <a:fld id="{0DE75569-4A32-0946-97B3-09718BD7F258}" type="datetimeFigureOut">
               <a:rPr lang="en-US" smtClean="0"/>
-              <a:t>8/30/18</a:t>
+              <a:t>9/4/18</a:t>
             </a:fld>
             <a:endParaRPr lang="en-US"/>
           </a:p>
@@ -638,7 +638,7 @@
           <a:p>
             <a:fld id="{0DE75569-4A32-0946-97B3-09718BD7F258}" type="datetimeFigureOut">
               <a:rPr lang="en-US" smtClean="0"/>
-              <a:t>8/30/18</a:t>
+              <a:t>9/4/18</a:t>
             </a:fld>
             <a:endParaRPr lang="en-US"/>
           </a:p>
@@ -808,7 +808,7 @@
           <a:p>
             <a:fld id="{0DE75569-4A32-0946-97B3-09718BD7F258}" type="datetimeFigureOut">
               <a:rPr lang="en-US" smtClean="0"/>
-              <a:t>8/30/18</a:t>
+              <a:t>9/4/18</a:t>
             </a:fld>
             <a:endParaRPr lang="en-US"/>
           </a:p>
@@ -1054,7 +1054,7 @@
           <a:p>
             <a:fld id="{0DE75569-4A32-0946-97B3-09718BD7F258}" type="datetimeFigureOut">
               <a:rPr lang="en-US" smtClean="0"/>
-              <a:t>8/30/18</a:t>
+              <a:t>9/4/18</a:t>
             </a:fld>
             <a:endParaRPr lang="en-US"/>
           </a:p>
@@ -1342,7 +1342,7 @@
           <a:p>
             <a:fld id="{0DE75569-4A32-0946-97B3-09718BD7F258}" type="datetimeFigureOut">
               <a:rPr lang="en-US" smtClean="0"/>
-              <a:t>8/30/18</a:t>
+              <a:t>9/4/18</a:t>
             </a:fld>
             <a:endParaRPr lang="en-US"/>
           </a:p>
@@ -1764,7 +1764,7 @@
           <a:p>
             <a:fld id="{0DE75569-4A32-0946-97B3-09718BD7F258}" type="datetimeFigureOut">
               <a:rPr lang="en-US" smtClean="0"/>
-              <a:t>8/30/18</a:t>
+              <a:t>9/4/18</a:t>
             </a:fld>
             <a:endParaRPr lang="en-US"/>
           </a:p>
@@ -1882,7 +1882,7 @@
           <a:p>
             <a:fld id="{0DE75569-4A32-0946-97B3-09718BD7F258}" type="datetimeFigureOut">
               <a:rPr lang="en-US" smtClean="0"/>
-              <a:t>8/30/18</a:t>
+              <a:t>9/4/18</a:t>
             </a:fld>
             <a:endParaRPr lang="en-US"/>
           </a:p>
@@ -1977,7 +1977,7 @@
           <a:p>
             <a:fld id="{0DE75569-4A32-0946-97B3-09718BD7F258}" type="datetimeFigureOut">
               <a:rPr lang="en-US" smtClean="0"/>
-              <a:t>8/30/18</a:t>
+              <a:t>9/4/18</a:t>
             </a:fld>
             <a:endParaRPr lang="en-US"/>
           </a:p>
@@ -2254,7 +2254,7 @@
           <a:p>
             <a:fld id="{0DE75569-4A32-0946-97B3-09718BD7F258}" type="datetimeFigureOut">
               <a:rPr lang="en-US" smtClean="0"/>
-              <a:t>8/30/18</a:t>
+              <a:t>9/4/18</a:t>
             </a:fld>
             <a:endParaRPr lang="en-US"/>
           </a:p>
@@ -2507,7 +2507,7 @@
           <a:p>
             <a:fld id="{0DE75569-4A32-0946-97B3-09718BD7F258}" type="datetimeFigureOut">
               <a:rPr lang="en-US" smtClean="0"/>
-              <a:t>8/30/18</a:t>
+              <a:t>9/4/18</a:t>
             </a:fld>
             <a:endParaRPr lang="en-US"/>
           </a:p>
@@ -2720,7 +2720,7 @@
           <a:p>
             <a:fld id="{0DE75569-4A32-0946-97B3-09718BD7F258}" type="datetimeFigureOut">
               <a:rPr lang="en-US" smtClean="0"/>
-              <a:t>8/30/18</a:t>
+              <a:t>9/4/18</a:t>
             </a:fld>
             <a:endParaRPr lang="en-US"/>
           </a:p>
@@ -3103,8 +3103,8 @@
         </p:nvCxnSpPr>
         <p:spPr>
           <a:xfrm flipH="1">
-            <a:off x="2450114" y="2604650"/>
-            <a:ext cx="746126" cy="0"/>
+            <a:off x="2348051" y="3345731"/>
+            <a:ext cx="919750" cy="0"/>
           </a:xfrm>
           <a:prstGeom prst="line">
             <a:avLst/>
@@ -3139,8 +3139,8 @@
         </p:nvSpPr>
         <p:spPr>
           <a:xfrm rot="19789060">
-            <a:off x="2823995" y="2421694"/>
-            <a:ext cx="298619" cy="330519"/>
+            <a:off x="2702076" y="3131712"/>
+            <a:ext cx="423825" cy="428024"/>
           </a:xfrm>
           <a:prstGeom prst="star5">
             <a:avLst/>
@@ -3165,7 +3165,7 @@
           <a:lstStyle/>
           <a:p>
             <a:pPr algn="ctr"/>
-            <a:endParaRPr lang="en-US"/>
+            <a:endParaRPr lang="en-US" sz="2800"/>
           </a:p>
         </p:txBody>
       </p:sp>
@@ -3177,7 +3177,7 @@
         </p:nvCxnSpPr>
         <p:spPr>
           <a:xfrm flipH="1">
-            <a:off x="5425234" y="1576035"/>
+            <a:off x="5646957" y="2408480"/>
             <a:ext cx="1059255" cy="0"/>
           </a:xfrm>
           <a:prstGeom prst="line">
@@ -3213,7 +3213,7 @@
         </p:nvCxnSpPr>
         <p:spPr>
           <a:xfrm flipH="1">
-            <a:off x="6030175" y="3213854"/>
+            <a:off x="6275360" y="4423801"/>
             <a:ext cx="411315" cy="0"/>
           </a:xfrm>
           <a:prstGeom prst="line">
@@ -3249,8 +3249,8 @@
         </p:nvSpPr>
         <p:spPr>
           <a:xfrm>
-            <a:off x="6167166" y="1283657"/>
-            <a:ext cx="274324" cy="261610"/>
+            <a:off x="6388889" y="1856244"/>
+            <a:ext cx="456315" cy="477054"/>
           </a:xfrm>
           <a:prstGeom prst="rect">
             <a:avLst/>
@@ -3264,7 +3264,7 @@
           <a:lstStyle/>
           <a:p>
             <a:r>
-              <a:rPr lang="en-US" sz="1400" b="1" dirty="0"/>
+              <a:rPr lang="en-US" sz="2800" b="1" dirty="0"/>
               <a:t>23</a:t>
             </a:r>
           </a:p>
@@ -3278,8 +3278,8 @@
         </p:nvSpPr>
         <p:spPr>
           <a:xfrm>
-            <a:off x="6157479" y="2924948"/>
-            <a:ext cx="274324" cy="261610"/>
+            <a:off x="6402664" y="4134895"/>
+            <a:ext cx="456315" cy="477054"/>
           </a:xfrm>
           <a:prstGeom prst="rect">
             <a:avLst/>
@@ -3293,7 +3293,7 @@
           <a:lstStyle/>
           <a:p>
             <a:r>
-              <a:rPr lang="en-US" sz="1400" b="1" dirty="0"/>
+              <a:rPr lang="en-US" sz="2800" b="1" dirty="0"/>
               <a:t>44</a:t>
             </a:r>
           </a:p>
@@ -3307,8 +3307,8 @@
         </p:nvSpPr>
         <p:spPr>
           <a:xfrm>
-            <a:off x="2815239" y="2698114"/>
-            <a:ext cx="317968" cy="261610"/>
+            <a:off x="2698168" y="3540771"/>
+            <a:ext cx="546171" cy="477054"/>
           </a:xfrm>
           <a:prstGeom prst="rect">
             <a:avLst/>
@@ -3322,7 +3322,7 @@
           <a:lstStyle/>
           <a:p>
             <a:r>
-              <a:rPr lang="en-US" sz="1400" i="1" dirty="0">
+              <a:rPr lang="en-US" sz="2800" i="1" dirty="0">
                 <a:solidFill>
                   <a:schemeClr val="tx2">
                     <a:lumMod val="60000"/>
@@ -3343,8 +3343,8 @@
         </p:nvSpPr>
         <p:spPr>
           <a:xfrm>
-            <a:off x="2299952" y="2052435"/>
-            <a:ext cx="300323" cy="292388"/>
+            <a:off x="1935895" y="2650755"/>
+            <a:ext cx="456315" cy="477054"/>
           </a:xfrm>
           <a:prstGeom prst="rect">
             <a:avLst/>
@@ -3358,7 +3358,7 @@
           <a:lstStyle/>
           <a:p>
             <a:r>
-              <a:rPr lang="en-US" sz="1600" b="1" dirty="0">
+              <a:rPr lang="en-US" sz="2800" b="1" dirty="0">
                 <a:solidFill>
                   <a:srgbClr val="FF6600"/>
                 </a:solidFill>
@@ -3376,8 +3376,8 @@
         </p:nvSpPr>
         <p:spPr>
           <a:xfrm>
-            <a:off x="3196240" y="1654380"/>
-            <a:ext cx="1678214" cy="1978786"/>
+            <a:off x="3244339" y="2226967"/>
+            <a:ext cx="1678214" cy="2238644"/>
           </a:xfrm>
           <a:prstGeom prst="rect">
             <a:avLst/>
@@ -3411,7 +3411,7 @@
           <a:lstStyle/>
           <a:p>
             <a:pPr algn="ctr"/>
-            <a:endParaRPr lang="en-US"/>
+            <a:endParaRPr lang="en-US" sz="2800"/>
           </a:p>
         </p:txBody>
       </p:sp>
@@ -3423,7 +3423,7 @@
         </p:nvSpPr>
         <p:spPr>
           <a:xfrm>
-            <a:off x="4549852" y="1351840"/>
+            <a:off x="4597951" y="2184285"/>
             <a:ext cx="1678214" cy="2588823"/>
           </a:xfrm>
           <a:prstGeom prst="rect">
@@ -3458,7 +3458,7 @@
           <a:lstStyle/>
           <a:p>
             <a:pPr algn="ctr"/>
-            <a:endParaRPr lang="en-US"/>
+            <a:endParaRPr lang="en-US" sz="2800"/>
           </a:p>
         </p:txBody>
       </p:sp>
@@ -3470,8 +3470,8 @@
         </p:nvSpPr>
         <p:spPr>
           <a:xfrm>
-            <a:off x="3598271" y="3151792"/>
-            <a:ext cx="1720145" cy="990048"/>
+            <a:off x="3669832" y="4168314"/>
+            <a:ext cx="1977125" cy="1552213"/>
           </a:xfrm>
           <a:prstGeom prst="rect">
             <a:avLst/>
@@ -3505,7 +3505,7 @@
           <a:lstStyle/>
           <a:p>
             <a:pPr algn="ctr"/>
-            <a:endParaRPr lang="en-US"/>
+            <a:endParaRPr lang="en-US" sz="2800"/>
           </a:p>
         </p:txBody>
       </p:sp>
@@ -3517,7 +3517,7 @@
         </p:nvSpPr>
         <p:spPr>
           <a:xfrm>
-            <a:off x="4586127" y="1654380"/>
+            <a:off x="4634226" y="2486825"/>
             <a:ext cx="1678214" cy="1900539"/>
           </a:xfrm>
           <a:prstGeom prst="rect">
@@ -3552,7 +3552,7 @@
           <a:lstStyle/>
           <a:p>
             <a:pPr algn="ctr"/>
-            <a:endParaRPr lang="en-US"/>
+            <a:endParaRPr lang="en-US" sz="2800"/>
           </a:p>
         </p:txBody>
       </p:sp>
@@ -3564,8 +3564,8 @@
         </p:nvSpPr>
         <p:spPr>
           <a:xfrm>
-            <a:off x="4374988" y="2791713"/>
-            <a:ext cx="920611" cy="727819"/>
+            <a:off x="4446549" y="3700806"/>
+            <a:ext cx="1074349" cy="1028674"/>
           </a:xfrm>
           <a:prstGeom prst="rect">
             <a:avLst/>
@@ -3599,19 +3599,19 @@
           <a:lstStyle/>
           <a:p>
             <a:pPr algn="ctr"/>
-            <a:endParaRPr lang="en-US"/>
-          </a:p>
-        </p:txBody>
-      </p:sp>
-      <p:sp>
-        <p:nvSpPr>
-          <p:cNvPr id="157" name="5-Point Star 156"/>
+            <a:endParaRPr lang="en-US" sz="2800"/>
+          </a:p>
+        </p:txBody>
+      </p:sp>
+      <p:sp>
+        <p:nvSpPr>
+          <p:cNvPr id="158" name="5-Point Star 157"/>
           <p:cNvSpPr/>
           <p:nvPr/>
         </p:nvSpPr>
         <p:spPr>
           <a:xfrm rot="19717469">
-            <a:off x="4601615" y="2664326"/>
+            <a:off x="4682276" y="1449260"/>
             <a:ext cx="249934" cy="254773"/>
           </a:xfrm>
           <a:prstGeom prst="star5">
@@ -3637,83 +3637,7 @@
           <a:lstStyle/>
           <a:p>
             <a:pPr algn="ctr"/>
-            <a:endParaRPr lang="en-US"/>
-          </a:p>
-        </p:txBody>
-      </p:sp>
-      <p:sp>
-        <p:nvSpPr>
-          <p:cNvPr id="131" name="5-Point Star 130"/>
-          <p:cNvSpPr/>
-          <p:nvPr/>
-        </p:nvSpPr>
-        <p:spPr>
-          <a:xfrm rot="19717469">
-            <a:off x="4894669" y="2683927"/>
-            <a:ext cx="249934" cy="254773"/>
-          </a:xfrm>
-          <a:prstGeom prst="star5">
-            <a:avLst/>
-          </a:prstGeom>
-        </p:spPr>
-        <p:style>
-          <a:lnRef idx="1">
-            <a:schemeClr val="accent1"/>
-          </a:lnRef>
-          <a:fillRef idx="3">
-            <a:schemeClr val="accent1"/>
-          </a:fillRef>
-          <a:effectRef idx="2">
-            <a:schemeClr val="accent1"/>
-          </a:effectRef>
-          <a:fontRef idx="minor">
-            <a:schemeClr val="lt1"/>
-          </a:fontRef>
-        </p:style>
-        <p:txBody>
-          <a:bodyPr lIns="45720" tIns="22860" rIns="45720" bIns="22860" spcCol="0" rtlCol="0" anchor="ctr"/>
-          <a:lstStyle/>
-          <a:p>
-            <a:pPr algn="ctr"/>
-            <a:endParaRPr lang="en-US"/>
-          </a:p>
-        </p:txBody>
-      </p:sp>
-      <p:sp>
-        <p:nvSpPr>
-          <p:cNvPr id="158" name="5-Point Star 157"/>
-          <p:cNvSpPr/>
-          <p:nvPr/>
-        </p:nvSpPr>
-        <p:spPr>
-          <a:xfrm rot="19717469">
-            <a:off x="4634177" y="876673"/>
-            <a:ext cx="249934" cy="254773"/>
-          </a:xfrm>
-          <a:prstGeom prst="star5">
-            <a:avLst/>
-          </a:prstGeom>
-        </p:spPr>
-        <p:style>
-          <a:lnRef idx="1">
-            <a:schemeClr val="accent1"/>
-          </a:lnRef>
-          <a:fillRef idx="3">
-            <a:schemeClr val="accent1"/>
-          </a:fillRef>
-          <a:effectRef idx="2">
-            <a:schemeClr val="accent1"/>
-          </a:effectRef>
-          <a:fontRef idx="minor">
-            <a:schemeClr val="lt1"/>
-          </a:fontRef>
-        </p:style>
-        <p:txBody>
-          <a:bodyPr lIns="45720" tIns="22860" rIns="45720" bIns="22860" spcCol="0" rtlCol="0" anchor="ctr"/>
-          <a:lstStyle/>
-          <a:p>
-            <a:pPr algn="ctr"/>
-            <a:endParaRPr lang="en-US"/>
+            <a:endParaRPr lang="en-US" sz="2800"/>
           </a:p>
         </p:txBody>
       </p:sp>
@@ -3725,8 +3649,8 @@
         </p:nvSpPr>
         <p:spPr>
           <a:xfrm>
-            <a:off x="3271700" y="3602909"/>
-            <a:ext cx="326571" cy="292388"/>
+            <a:off x="3204768" y="4534581"/>
+            <a:ext cx="646577" cy="477054"/>
           </a:xfrm>
           <a:prstGeom prst="rect">
             <a:avLst/>
@@ -3740,14 +3664,14 @@
           <a:lstStyle/>
           <a:p>
             <a:r>
-              <a:rPr lang="en-US" sz="1600" b="1" dirty="0" smtClean="0">
+              <a:rPr lang="en-US" sz="2800" b="1" dirty="0" smtClean="0">
                 <a:solidFill>
                   <a:srgbClr val="FF6600"/>
                 </a:solidFill>
               </a:rPr>
               <a:t>55</a:t>
             </a:r>
-            <a:endParaRPr lang="en-US" sz="1600" b="1" dirty="0">
+            <a:endParaRPr lang="en-US" sz="2800" b="1" dirty="0">
               <a:solidFill>
                 <a:srgbClr val="FF6600"/>
               </a:solidFill>
@@ -3763,8 +3687,8 @@
         </p:nvSpPr>
         <p:spPr>
           <a:xfrm>
-            <a:off x="4074665" y="2838943"/>
-            <a:ext cx="300323" cy="292388"/>
+            <a:off x="3971673" y="4137328"/>
+            <a:ext cx="456315" cy="477054"/>
           </a:xfrm>
           <a:prstGeom prst="rect">
             <a:avLst/>
@@ -3778,14 +3702,14 @@
           <a:lstStyle/>
           <a:p>
             <a:r>
-              <a:rPr lang="en-US" sz="1600" b="1" dirty="0" smtClean="0">
+              <a:rPr lang="en-US" sz="2800" b="1" dirty="0" smtClean="0">
                 <a:solidFill>
                   <a:srgbClr val="FF6600"/>
                 </a:solidFill>
               </a:rPr>
               <a:t>44</a:t>
             </a:r>
-            <a:endParaRPr lang="en-US" sz="1600" b="1" dirty="0">
+            <a:endParaRPr lang="en-US" sz="2800" b="1" dirty="0">
               <a:solidFill>
                 <a:srgbClr val="FF6600"/>
               </a:solidFill>
@@ -3801,8 +3725,8 @@
         </p:nvSpPr>
         <p:spPr>
           <a:xfrm>
-            <a:off x="4147893" y="837749"/>
-            <a:ext cx="300323" cy="292388"/>
+            <a:off x="4073590" y="1250892"/>
+            <a:ext cx="456315" cy="477054"/>
           </a:xfrm>
           <a:prstGeom prst="rect">
             <a:avLst/>
@@ -3816,14 +3740,14 @@
           <a:lstStyle/>
           <a:p>
             <a:r>
-              <a:rPr lang="en-US" sz="1600" b="1" dirty="0" smtClean="0">
+              <a:rPr lang="en-US" sz="2800" b="1" dirty="0" smtClean="0">
                 <a:solidFill>
                   <a:srgbClr val="FF6600"/>
                 </a:solidFill>
               </a:rPr>
               <a:t>24</a:t>
             </a:r>
-            <a:endParaRPr lang="en-US" sz="1600" b="1" dirty="0">
+            <a:endParaRPr lang="en-US" sz="2800" b="1" dirty="0">
               <a:solidFill>
                 <a:srgbClr val="FF6600"/>
               </a:solidFill>
@@ -3839,7 +3763,7 @@
         </p:nvSpPr>
         <p:spPr>
           <a:xfrm rot="20428888">
-            <a:off x="2199119" y="2376050"/>
+            <a:off x="1954511" y="3132676"/>
             <a:ext cx="501989" cy="457200"/>
           </a:xfrm>
           <a:prstGeom prst="sun">
@@ -3868,190 +3792,7 @@
           <a:lstStyle/>
           <a:p>
             <a:pPr algn="ctr"/>
-            <a:endParaRPr lang="en-US"/>
-          </a:p>
-        </p:txBody>
-      </p:sp>
-      <p:sp>
-        <p:nvSpPr>
-          <p:cNvPr id="165" name="TextBox 164"/>
-          <p:cNvSpPr txBox="1"/>
-          <p:nvPr/>
-        </p:nvSpPr>
-        <p:spPr>
-          <a:xfrm>
-            <a:off x="1302699" y="4311409"/>
-            <a:ext cx="6904216" cy="2462213"/>
-          </a:xfrm>
-          <a:prstGeom prst="rect">
-            <a:avLst/>
-          </a:prstGeom>
-          <a:noFill/>
-        </p:spPr>
-        <p:txBody>
-          <a:bodyPr wrap="none" rtlCol="0">
-            <a:spAutoFit/>
-          </a:bodyPr>
-          <a:lstStyle/>
-          <a:p>
-            <a:r>
-              <a:rPr lang="en-US" sz="1400" b="1" dirty="0" smtClean="0"/>
-              <a:t>Figure 1</a:t>
-            </a:r>
-            <a:r>
-              <a:rPr lang="en-US" sz="1400" dirty="0" smtClean="0"/>
-              <a:t>: </a:t>
-            </a:r>
-          </a:p>
-          <a:p>
-            <a:r>
-              <a:rPr lang="en-US" sz="1400" dirty="0" smtClean="0"/>
-              <a:t>Simple </a:t>
-            </a:r>
-            <a:r>
-              <a:rPr lang="en-US" sz="1400" dirty="0" err="1" smtClean="0"/>
-              <a:t>cladogram</a:t>
-            </a:r>
-            <a:r>
-              <a:rPr lang="en-US" sz="1400" dirty="0" smtClean="0"/>
-              <a:t> of major cereal speciation. Numbers are in MYA (millions of years ago).</a:t>
-            </a:r>
-          </a:p>
-          <a:p>
-            <a:r>
-              <a:rPr lang="en-US" sz="1400" dirty="0" smtClean="0"/>
-              <a:t>Orange sun: grass speciation event 75 MYA.  Blue stars: polyploidy events; </a:t>
-            </a:r>
-          </a:p>
-          <a:p>
-            <a:r>
-              <a:rPr lang="en-US" sz="1400" dirty="0"/>
-              <a:t>t</a:t>
-            </a:r>
-            <a:r>
-              <a:rPr lang="en-US" sz="1400" dirty="0" smtClean="0"/>
-              <a:t>he major grass polyploidy event immediately after the grass speciation event occurred </a:t>
-            </a:r>
-            <a:endParaRPr lang="en-US" sz="1400" dirty="0"/>
-          </a:p>
-          <a:p>
-            <a:r>
-              <a:rPr lang="en-US" sz="1400" dirty="0" smtClean="0"/>
-              <a:t>approximately 70 MYA. The </a:t>
-            </a:r>
-            <a:r>
-              <a:rPr lang="en-US" sz="1400" i="1" dirty="0" err="1" smtClean="0"/>
-              <a:t>Ehrhartoideae</a:t>
-            </a:r>
-            <a:r>
-              <a:rPr lang="en-US" sz="1400" dirty="0" smtClean="0"/>
-              <a:t> clade, which includes rice, arose </a:t>
-            </a:r>
-          </a:p>
-          <a:p>
-            <a:r>
-              <a:rPr lang="en-US" sz="1400" dirty="0" smtClean="0"/>
-              <a:t>approximately 55MYA. The </a:t>
-            </a:r>
-            <a:r>
-              <a:rPr lang="en-US" sz="1400" i="1" dirty="0" err="1" smtClean="0"/>
-              <a:t>Pooideae</a:t>
-            </a:r>
-            <a:r>
-              <a:rPr lang="en-US" sz="1400" dirty="0" smtClean="0"/>
-              <a:t> clade, which includes wheat and barley, </a:t>
-            </a:r>
-          </a:p>
-          <a:p>
-            <a:r>
-              <a:rPr lang="en-US" sz="1400" dirty="0" smtClean="0"/>
-              <a:t>arose around 44MYA; </a:t>
-            </a:r>
-            <a:r>
-              <a:rPr lang="en-US" sz="1400" i="1" dirty="0" err="1" smtClean="0"/>
-              <a:t>Chloridoideae</a:t>
-            </a:r>
-            <a:r>
-              <a:rPr lang="en-US" sz="1400" dirty="0" smtClean="0"/>
-              <a:t> which contains foxtail millet 28 </a:t>
-            </a:r>
-            <a:r>
-              <a:rPr lang="en-US" sz="1400" dirty="0" err="1" smtClean="0"/>
-              <a:t>Mya</a:t>
-            </a:r>
-            <a:r>
-              <a:rPr lang="en-US" sz="1400" dirty="0" smtClean="0"/>
-              <a:t>, and the </a:t>
-            </a:r>
-            <a:r>
-              <a:rPr lang="en-US" sz="1400" dirty="0" err="1"/>
-              <a:t>P</a:t>
-            </a:r>
-            <a:r>
-              <a:rPr lang="en-US" sz="1400" dirty="0" err="1" smtClean="0"/>
-              <a:t>anicoids</a:t>
-            </a:r>
-            <a:r>
-              <a:rPr lang="en-US" sz="1400" dirty="0" smtClean="0"/>
-              <a:t>, </a:t>
-            </a:r>
-          </a:p>
-          <a:p>
-            <a:r>
-              <a:rPr lang="en-US" sz="1400" dirty="0" smtClean="0"/>
-              <a:t>which include maize and sorghum, arose approximately 24MYA. </a:t>
-            </a:r>
-            <a:r>
-              <a:rPr lang="en-US" sz="1400" dirty="0" smtClean="0"/>
-              <a:t>The branch length is not </a:t>
-            </a:r>
-          </a:p>
-          <a:p>
-            <a:r>
-              <a:rPr lang="en-US" sz="1400" dirty="0" smtClean="0"/>
-              <a:t>proportional to the number of substitutions per site.</a:t>
-            </a:r>
-          </a:p>
-          <a:p>
-            <a:r>
-              <a:rPr lang="en-US" sz="1400" dirty="0" smtClean="0"/>
-              <a:t>From  </a:t>
-            </a:r>
-            <a:r>
-              <a:rPr lang="en-US" sz="1400" dirty="0" err="1" smtClean="0"/>
-              <a:t>doi.org</a:t>
-            </a:r>
-            <a:r>
-              <a:rPr lang="en-US" sz="1400" dirty="0"/>
-              <a:t>/10.1111/j.1095-8339.2010.01041.</a:t>
-            </a:r>
-            <a:r>
-              <a:rPr lang="en-US" sz="1400" dirty="0" smtClean="0"/>
-              <a:t>x, </a:t>
-            </a:r>
-          </a:p>
-          <a:p>
-            <a:r>
-              <a:rPr lang="en-US" sz="1400" dirty="0" smtClean="0"/>
-              <a:t>10.1073</a:t>
-            </a:r>
-            <a:r>
-              <a:rPr lang="en-US" sz="1400" dirty="0"/>
-              <a:t>/pnas.</a:t>
-            </a:r>
-            <a:r>
-              <a:rPr lang="en-US" sz="1400" dirty="0" smtClean="0"/>
-              <a:t>0307901101, and https://</a:t>
-            </a:r>
-            <a:r>
-              <a:rPr lang="en-US" sz="1400" dirty="0" err="1" smtClean="0"/>
-              <a:t>doi.org</a:t>
-            </a:r>
-            <a:r>
-              <a:rPr lang="en-US" sz="1400" dirty="0" smtClean="0"/>
-              <a:t>/10.1104/pp.015727</a:t>
-            </a:r>
-            <a:endParaRPr lang="en-US" sz="1400" dirty="0"/>
+            <a:endParaRPr lang="en-US" sz="2800"/>
           </a:p>
         </p:txBody>
       </p:sp>
@@ -4063,7 +3804,7 @@
         </p:nvSpPr>
         <p:spPr>
           <a:xfrm>
-            <a:off x="4196760" y="1159356"/>
+            <a:off x="4244859" y="1731943"/>
             <a:ext cx="1228473" cy="990048"/>
           </a:xfrm>
           <a:prstGeom prst="rect">
@@ -4098,7 +3839,7 @@
           <a:lstStyle/>
           <a:p>
             <a:pPr algn="ctr"/>
-            <a:endParaRPr lang="en-US"/>
+            <a:endParaRPr lang="en-US" sz="2800"/>
           </a:p>
         </p:txBody>
       </p:sp>
@@ -4110,8 +3851,8 @@
         </p:nvSpPr>
         <p:spPr>
           <a:xfrm>
-            <a:off x="4481806" y="799277"/>
-            <a:ext cx="920611" cy="727819"/>
+            <a:off x="4529905" y="1180651"/>
+            <a:ext cx="1117052" cy="919032"/>
           </a:xfrm>
           <a:prstGeom prst="rect">
             <a:avLst/>
@@ -4145,7 +3886,7 @@
           <a:lstStyle/>
           <a:p>
             <a:pPr algn="ctr"/>
-            <a:endParaRPr lang="en-US"/>
+            <a:endParaRPr lang="en-US" sz="2800"/>
           </a:p>
         </p:txBody>
       </p:sp>
@@ -4157,8 +3898,8 @@
         </p:nvSpPr>
         <p:spPr>
           <a:xfrm>
-            <a:off x="5228395" y="692658"/>
-            <a:ext cx="1678214" cy="3628600"/>
+            <a:off x="5450515" y="768867"/>
+            <a:ext cx="1706235" cy="5027688"/>
           </a:xfrm>
           <a:prstGeom prst="rect">
             <a:avLst/>
@@ -4192,7 +3933,7 @@
           <a:lstStyle/>
           <a:p>
             <a:pPr algn="ctr"/>
-            <a:endParaRPr lang="en-US"/>
+            <a:endParaRPr lang="en-US" sz="2800"/>
           </a:p>
         </p:txBody>
       </p:sp>
@@ -4204,8 +3945,8 @@
         </p:nvSpPr>
         <p:spPr>
           <a:xfrm>
-            <a:off x="3896437" y="1654380"/>
-            <a:ext cx="300323" cy="292388"/>
+            <a:off x="3716378" y="2185105"/>
+            <a:ext cx="456315" cy="477054"/>
           </a:xfrm>
           <a:prstGeom prst="rect">
             <a:avLst/>
@@ -4219,14 +3960,14 @@
           <a:lstStyle/>
           <a:p>
             <a:r>
-              <a:rPr lang="en-US" sz="1600" b="1" dirty="0" smtClean="0">
+              <a:rPr lang="en-US" sz="2800" b="1" dirty="0" smtClean="0">
                 <a:solidFill>
                   <a:srgbClr val="FF6600"/>
                 </a:solidFill>
               </a:rPr>
               <a:t>28</a:t>
             </a:r>
-            <a:endParaRPr lang="en-US" sz="1600" b="1" dirty="0">
+            <a:endParaRPr lang="en-US" sz="2800" b="1" dirty="0">
               <a:solidFill>
                 <a:srgbClr val="FF6600"/>
               </a:solidFill>
@@ -4242,8 +3983,8 @@
         </p:nvSpPr>
         <p:spPr>
           <a:xfrm>
-            <a:off x="5229983" y="614611"/>
-            <a:ext cx="738637" cy="369332"/>
+            <a:off x="5520898" y="903672"/>
+            <a:ext cx="954072" cy="477054"/>
           </a:xfrm>
           <a:prstGeom prst="rect">
             <a:avLst/>
@@ -4257,10 +3998,10 @@
           <a:lstStyle/>
           <a:p>
             <a:r>
-              <a:rPr lang="en-US" dirty="0" smtClean="0"/>
+              <a:rPr lang="en-US" sz="2800" dirty="0" smtClean="0"/>
               <a:t>maize</a:t>
             </a:r>
-            <a:endParaRPr lang="en-US" dirty="0"/>
+            <a:endParaRPr lang="en-US" sz="2800" dirty="0"/>
           </a:p>
         </p:txBody>
       </p:sp>
@@ -4272,8 +4013,8 @@
         </p:nvSpPr>
         <p:spPr>
           <a:xfrm>
-            <a:off x="5228395" y="1267238"/>
-            <a:ext cx="1058437" cy="369332"/>
+            <a:off x="5531546" y="1750470"/>
+            <a:ext cx="1380471" cy="477054"/>
           </a:xfrm>
           <a:prstGeom prst="rect">
             <a:avLst/>
@@ -4287,10 +4028,10 @@
           <a:lstStyle/>
           <a:p>
             <a:r>
-              <a:rPr lang="en-US" dirty="0" smtClean="0"/>
+              <a:rPr lang="en-US" sz="2800" dirty="0" smtClean="0"/>
               <a:t>sorghum</a:t>
             </a:r>
-            <a:endParaRPr lang="en-US" dirty="0"/>
+            <a:endParaRPr lang="en-US" sz="2800" dirty="0"/>
           </a:p>
         </p:txBody>
       </p:sp>
@@ -4302,8 +4043,8 @@
         </p:nvSpPr>
         <p:spPr>
           <a:xfrm>
-            <a:off x="5224686" y="3263834"/>
-            <a:ext cx="784830" cy="369332"/>
+            <a:off x="5469871" y="4395437"/>
+            <a:ext cx="1002839" cy="477054"/>
           </a:xfrm>
           <a:prstGeom prst="rect">
             <a:avLst/>
@@ -4317,10 +4058,10 @@
           <a:lstStyle/>
           <a:p>
             <a:r>
-              <a:rPr lang="en-US" dirty="0" smtClean="0"/>
+              <a:rPr lang="en-US" sz="2800" dirty="0" smtClean="0"/>
               <a:t>barley</a:t>
             </a:r>
-            <a:endParaRPr lang="en-US" dirty="0"/>
+            <a:endParaRPr lang="en-US" sz="2800" dirty="0"/>
           </a:p>
         </p:txBody>
       </p:sp>
@@ -4332,8 +4073,8 @@
         </p:nvSpPr>
         <p:spPr>
           <a:xfrm>
-            <a:off x="5229983" y="2581718"/>
-            <a:ext cx="779533" cy="369332"/>
+            <a:off x="5520898" y="3397574"/>
+            <a:ext cx="1008599" cy="477054"/>
           </a:xfrm>
           <a:prstGeom prst="rect">
             <a:avLst/>
@@ -4347,10 +4088,10 @@
           <a:lstStyle/>
           <a:p>
             <a:r>
-              <a:rPr lang="en-US" dirty="0" smtClean="0"/>
+              <a:rPr lang="en-US" sz="2800" dirty="0" smtClean="0"/>
               <a:t>wheat</a:t>
             </a:r>
-            <a:endParaRPr lang="en-US" dirty="0"/>
+            <a:endParaRPr lang="en-US" sz="2800" dirty="0"/>
           </a:p>
         </p:txBody>
       </p:sp>
@@ -4362,8 +4103,8 @@
         </p:nvSpPr>
         <p:spPr>
           <a:xfrm>
-            <a:off x="5230502" y="3882625"/>
-            <a:ext cx="495895" cy="369332"/>
+            <a:off x="5520898" y="5431221"/>
+            <a:ext cx="630416" cy="477054"/>
           </a:xfrm>
           <a:prstGeom prst="rect">
             <a:avLst/>
@@ -4377,10 +4118,10 @@
           <a:lstStyle/>
           <a:p>
             <a:r>
-              <a:rPr lang="en-US" dirty="0" smtClean="0"/>
+              <a:rPr lang="en-US" sz="2800" dirty="0" smtClean="0"/>
               <a:t>rice</a:t>
             </a:r>
-            <a:endParaRPr lang="en-US" dirty="0"/>
+            <a:endParaRPr lang="en-US" sz="2800" dirty="0"/>
           </a:p>
         </p:txBody>
       </p:sp>
@@ -4392,8 +4133,8 @@
         </p:nvSpPr>
         <p:spPr>
           <a:xfrm>
-            <a:off x="5224686" y="1935994"/>
-            <a:ext cx="717072" cy="369332"/>
+            <a:off x="5495717" y="2403217"/>
+            <a:ext cx="925894" cy="477054"/>
           </a:xfrm>
           <a:prstGeom prst="rect">
             <a:avLst/>
@@ -4407,23 +4148,23 @@
           <a:lstStyle/>
           <a:p>
             <a:r>
-              <a:rPr lang="en-US" dirty="0" smtClean="0"/>
+              <a:rPr lang="en-US" sz="2800" dirty="0" smtClean="0"/>
               <a:t>millet</a:t>
             </a:r>
-            <a:endParaRPr lang="en-US" dirty="0"/>
-          </a:p>
-        </p:txBody>
-      </p:sp>
-      <p:sp>
-        <p:nvSpPr>
-          <p:cNvPr id="174" name="5-Point Star 173"/>
+            <a:endParaRPr lang="en-US" sz="2800" dirty="0"/>
+          </a:p>
+        </p:txBody>
+      </p:sp>
+      <p:sp>
+        <p:nvSpPr>
+          <p:cNvPr id="47" name="5-Point Star 46"/>
           <p:cNvSpPr/>
           <p:nvPr/>
         </p:nvSpPr>
         <p:spPr>
-          <a:xfrm rot="19717469">
-            <a:off x="4749486" y="654501"/>
-            <a:ext cx="249934" cy="254773"/>
+          <a:xfrm rot="19789060">
+            <a:off x="4651011" y="951521"/>
+            <a:ext cx="423825" cy="428024"/>
           </a:xfrm>
           <a:prstGeom prst="star5">
             <a:avLst/>
@@ -4448,7 +4189,83 @@
           <a:lstStyle/>
           <a:p>
             <a:pPr algn="ctr"/>
-            <a:endParaRPr lang="en-US"/>
+            <a:endParaRPr lang="en-US" sz="2800"/>
+          </a:p>
+        </p:txBody>
+      </p:sp>
+      <p:sp>
+        <p:nvSpPr>
+          <p:cNvPr id="48" name="5-Point Star 47"/>
+          <p:cNvSpPr/>
+          <p:nvPr/>
+        </p:nvSpPr>
+        <p:spPr>
+          <a:xfrm rot="19789060">
+            <a:off x="4564408" y="3515638"/>
+            <a:ext cx="423825" cy="428024"/>
+          </a:xfrm>
+          <a:prstGeom prst="star5">
+            <a:avLst/>
+          </a:prstGeom>
+        </p:spPr>
+        <p:style>
+          <a:lnRef idx="1">
+            <a:schemeClr val="accent1"/>
+          </a:lnRef>
+          <a:fillRef idx="3">
+            <a:schemeClr val="accent1"/>
+          </a:fillRef>
+          <a:effectRef idx="2">
+            <a:schemeClr val="accent1"/>
+          </a:effectRef>
+          <a:fontRef idx="minor">
+            <a:schemeClr val="lt1"/>
+          </a:fontRef>
+        </p:style>
+        <p:txBody>
+          <a:bodyPr lIns="45720" tIns="22860" rIns="45720" bIns="22860" spcCol="0" rtlCol="0" anchor="ctr"/>
+          <a:lstStyle/>
+          <a:p>
+            <a:pPr algn="ctr"/>
+            <a:endParaRPr lang="en-US" sz="2800"/>
+          </a:p>
+        </p:txBody>
+      </p:sp>
+      <p:sp>
+        <p:nvSpPr>
+          <p:cNvPr id="49" name="5-Point Star 48"/>
+          <p:cNvSpPr/>
+          <p:nvPr/>
+        </p:nvSpPr>
+        <p:spPr>
+          <a:xfrm rot="19789060">
+            <a:off x="4941791" y="3426620"/>
+            <a:ext cx="423825" cy="428024"/>
+          </a:xfrm>
+          <a:prstGeom prst="star5">
+            <a:avLst/>
+          </a:prstGeom>
+        </p:spPr>
+        <p:style>
+          <a:lnRef idx="1">
+            <a:schemeClr val="accent1"/>
+          </a:lnRef>
+          <a:fillRef idx="3">
+            <a:schemeClr val="accent1"/>
+          </a:fillRef>
+          <a:effectRef idx="2">
+            <a:schemeClr val="accent1"/>
+          </a:effectRef>
+          <a:fontRef idx="minor">
+            <a:schemeClr val="lt1"/>
+          </a:fontRef>
+        </p:style>
+        <p:txBody>
+          <a:bodyPr lIns="45720" tIns="22860" rIns="45720" bIns="22860" spcCol="0" rtlCol="0" anchor="ctr"/>
+          <a:lstStyle/>
+          <a:p>
+            <a:pPr algn="ctr"/>
+            <a:endParaRPr lang="en-US" sz="2800"/>
           </a:p>
         </p:txBody>
       </p:sp>

</xml_diff>